<commit_message>
adding solved folders and files for activities  for Day 2 VBA
</commit_message>
<xml_diff>
--- a/02-Lessons-VBA/Assignment_Resources/Methodology.pptx
+++ b/02-Lessons-VBA/Assignment_Resources/Methodology.pptx
@@ -3525,8 +3525,8 @@
         </p:nvSpPr>
         <p:spPr>
           <a:xfrm>
-            <a:off x="4934305" y="1343943"/>
-            <a:ext cx="6878129" cy="2062103"/>
+            <a:off x="4934306" y="1205989"/>
+            <a:ext cx="6878129" cy="2308324"/>
           </a:xfrm>
           <a:prstGeom prst="rect">
             <a:avLst/>
@@ -3586,6 +3586,16 @@
             <a:r>
               <a:rPr lang="en-US" sz="1600" dirty="0"/>
               <a:t>2.4.2 Conditional Formatting</a:t>
+            </a:r>
+          </a:p>
+          <a:p>
+            <a:pPr marL="742950" lvl="1" indent="-285750">
+              <a:buFont typeface="Calibri" panose="020F0502020204030204" pitchFamily="34" charset="0"/>
+              <a:buChar char="―"/>
+            </a:pPr>
+            <a:r>
+              <a:rPr lang="en-US" sz="1600" dirty="0"/>
+              <a:t>Quality Control</a:t>
             </a:r>
           </a:p>
           <a:p>

</xml_diff>